<commit_message>
feat: Add Controllers Summary, Database Schema, and Final Report; update User Guide and various services
</commit_message>
<xml_diff>
--- a/DoConnect_AnkitDwivedi_Presentation.pptx
+++ b/DoConnect_AnkitDwivedi_Presentation.pptx
@@ -4437,76 +4437,85 @@
         <p:spPr/>
         <p:txBody>
           <a:bodyPr>
-            <a:normAutofit fontScale="62500" lnSpcReduction="20000"/>
+            <a:normAutofit fontScale="70000" lnSpcReduction="20000"/>
           </a:bodyPr>
           <a:lstStyle/>
           <a:p>
             <a:r>
+              <a:rPr dirty="0"/>
               <a:t>Problem &amp; Objectives</a:t>
             </a:r>
           </a:p>
           <a:p>
             <a:r>
+              <a:rPr dirty="0"/>
               <a:t>Key Features</a:t>
             </a:r>
           </a:p>
           <a:p>
             <a:r>
+              <a:rPr dirty="0"/>
               <a:t>Tech Stack</a:t>
             </a:r>
           </a:p>
           <a:p>
             <a:r>
+              <a:rPr dirty="0"/>
               <a:t>System Architecture</a:t>
             </a:r>
           </a:p>
           <a:p>
             <a:r>
+              <a:rPr dirty="0"/>
               <a:t>Modules (Frontend &amp; Backend)</a:t>
             </a:r>
           </a:p>
           <a:p>
             <a:r>
+              <a:rPr dirty="0"/>
               <a:t>REST API Overview</a:t>
             </a:r>
           </a:p>
           <a:p>
             <a:r>
+              <a:rPr dirty="0"/>
               <a:t>Data Model &amp; ERD</a:t>
             </a:r>
           </a:p>
           <a:p>
             <a:r>
+              <a:rPr dirty="0"/>
               <a:t>Security &amp; Validation</a:t>
             </a:r>
           </a:p>
           <a:p>
             <a:r>
+              <a:rPr dirty="0"/>
               <a:t>Testing Strategy</a:t>
             </a:r>
-          </a:p>
-          <a:p>
-            <a:r>
-              <a:t>Deployment &amp; DevOps</a:t>
-            </a:r>
-          </a:p>
-          <a:p>
-            <a:r>
+            <a:endParaRPr lang="en-IN" dirty="0"/>
+          </a:p>
+          <a:p>
+            <a:r>
+              <a:rPr dirty="0"/>
               <a:t>Accessibility &amp; UX</a:t>
             </a:r>
           </a:p>
           <a:p>
             <a:r>
+              <a:rPr dirty="0"/>
               <a:t>Demo Flow &amp; Screenshots</a:t>
             </a:r>
           </a:p>
           <a:p>
             <a:r>
+              <a:rPr dirty="0"/>
               <a:t>Results, Challenges, Future Work</a:t>
             </a:r>
           </a:p>
           <a:p>
             <a:r>
+              <a:rPr dirty="0"/>
               <a:t>Conclusion &amp; Q&amp;A</a:t>
             </a:r>
           </a:p>
@@ -5991,21 +6000,25 @@
           <a:lstStyle/>
           <a:p>
             <a:r>
+              <a:rPr dirty="0"/>
               <a:t>Ask Questions with images; Answer with images.</a:t>
             </a:r>
           </a:p>
           <a:p>
             <a:r>
+              <a:rPr dirty="0"/>
               <a:t>Approve/Reject workflow for Admin; delete images on reject.</a:t>
             </a:r>
           </a:p>
           <a:p>
             <a:r>
+              <a:rPr dirty="0"/>
               <a:t>Search, tag chips, and pagination.</a:t>
             </a:r>
           </a:p>
           <a:p>
             <a:r>
+              <a:rPr dirty="0"/>
               <a:t>Profile management; responsive navbar with user dropdown.</a:t>
             </a:r>
           </a:p>
@@ -6139,32 +6152,35 @@
           </a:p>
         </p:txBody>
       </p:sp>
-      <p:sp>
-        <p:nvSpPr>
-          <p:cNvPr id="3" name="Content Placeholder 2"/>
-          <p:cNvSpPr>
-            <a:spLocks noGrp="1"/>
-          </p:cNvSpPr>
+      <p:pic>
+        <p:nvPicPr>
+          <p:cNvPr id="5" name="Content Placeholder 4">
+            <a:extLst>
+              <a:ext uri="{FF2B5EF4-FFF2-40B4-BE49-F238E27FC236}">
+                <a16:creationId xmlns:a16="http://schemas.microsoft.com/office/drawing/2014/main" id="{2CE5BE75-72B7-BB11-2C11-2E20033A751D}"/>
+              </a:ext>
+            </a:extLst>
+          </p:cNvPr>
+          <p:cNvPicPr>
+            <a:picLocks noGrp="1" noChangeAspect="1"/>
+          </p:cNvPicPr>
           <p:nvPr>
             <p:ph idx="1"/>
           </p:nvPr>
-        </p:nvSpPr>
-        <p:spPr/>
-        <p:txBody>
-          <a:bodyPr/>
-          <a:lstStyle/>
-          <a:p>
-            <a:r>
-              <a:t>[Insert image here: DoConnect_System_Architecture.png]</a:t>
-            </a:r>
-          </a:p>
-          <a:p>
-            <a:r>
-              <a:t>Insert the latest architecture diagram if missing.</a:t>
-            </a:r>
-          </a:p>
-        </p:txBody>
-      </p:sp>
+        </p:nvPicPr>
+        <p:blipFill>
+          <a:blip r:embed="rId2"/>
+          <a:stretch>
+            <a:fillRect/>
+          </a:stretch>
+        </p:blipFill>
+        <p:spPr>
+          <a:xfrm>
+            <a:off x="1064855" y="1600200"/>
+            <a:ext cx="7014290" cy="4525963"/>
+          </a:xfrm>
+        </p:spPr>
+      </p:pic>
     </p:spTree>
   </p:cSld>
   <p:clrMapOvr>

</xml_diff>